<commit_message>
Improve image data formats course figure
</commit_message>
<xml_diff>
--- a/figures/resources/image_data_formats_course.pptx
+++ b/figures/resources/image_data_formats_course.pptx
@@ -7,6 +7,7 @@
   <p:sldIdLst>
     <p:sldId id="256" r:id="rId2"/>
     <p:sldId id="257" r:id="rId3"/>
+    <p:sldId id="258" r:id="rId4"/>
   </p:sldIdLst>
   <p:sldSz cx="12192000" cy="6858000"/>
   <p:notesSz cx="6858000" cy="9144000"/>
@@ -262,7 +263,7 @@
           <a:p>
             <a:fld id="{750C4F48-5AC2-ED47-9644-5F9E688EC8A9}" type="datetimeFigureOut">
               <a:rPr lang="de-DE" smtClean="0"/>
-              <a:t>06.02.25</a:t>
+              <a:t>17.02.25</a:t>
             </a:fld>
             <a:endParaRPr lang="de-DE"/>
           </a:p>
@@ -462,7 +463,7 @@
           <a:p>
             <a:fld id="{750C4F48-5AC2-ED47-9644-5F9E688EC8A9}" type="datetimeFigureOut">
               <a:rPr lang="de-DE" smtClean="0"/>
-              <a:t>06.02.25</a:t>
+              <a:t>17.02.25</a:t>
             </a:fld>
             <a:endParaRPr lang="de-DE"/>
           </a:p>
@@ -672,7 +673,7 @@
           <a:p>
             <a:fld id="{750C4F48-5AC2-ED47-9644-5F9E688EC8A9}" type="datetimeFigureOut">
               <a:rPr lang="de-DE" smtClean="0"/>
-              <a:t>06.02.25</a:t>
+              <a:t>17.02.25</a:t>
             </a:fld>
             <a:endParaRPr lang="de-DE"/>
           </a:p>
@@ -872,7 +873,7 @@
           <a:p>
             <a:fld id="{750C4F48-5AC2-ED47-9644-5F9E688EC8A9}" type="datetimeFigureOut">
               <a:rPr lang="de-DE" smtClean="0"/>
-              <a:t>06.02.25</a:t>
+              <a:t>17.02.25</a:t>
             </a:fld>
             <a:endParaRPr lang="de-DE"/>
           </a:p>
@@ -1148,7 +1149,7 @@
           <a:p>
             <a:fld id="{750C4F48-5AC2-ED47-9644-5F9E688EC8A9}" type="datetimeFigureOut">
               <a:rPr lang="de-DE" smtClean="0"/>
-              <a:t>06.02.25</a:t>
+              <a:t>17.02.25</a:t>
             </a:fld>
             <a:endParaRPr lang="de-DE"/>
           </a:p>
@@ -1416,7 +1417,7 @@
           <a:p>
             <a:fld id="{750C4F48-5AC2-ED47-9644-5F9E688EC8A9}" type="datetimeFigureOut">
               <a:rPr lang="de-DE" smtClean="0"/>
-              <a:t>06.02.25</a:t>
+              <a:t>17.02.25</a:t>
             </a:fld>
             <a:endParaRPr lang="de-DE"/>
           </a:p>
@@ -1831,7 +1832,7 @@
           <a:p>
             <a:fld id="{750C4F48-5AC2-ED47-9644-5F9E688EC8A9}" type="datetimeFigureOut">
               <a:rPr lang="de-DE" smtClean="0"/>
-              <a:t>06.02.25</a:t>
+              <a:t>17.02.25</a:t>
             </a:fld>
             <a:endParaRPr lang="de-DE"/>
           </a:p>
@@ -1973,7 +1974,7 @@
           <a:p>
             <a:fld id="{750C4F48-5AC2-ED47-9644-5F9E688EC8A9}" type="datetimeFigureOut">
               <a:rPr lang="de-DE" smtClean="0"/>
-              <a:t>06.02.25</a:t>
+              <a:t>17.02.25</a:t>
             </a:fld>
             <a:endParaRPr lang="de-DE"/>
           </a:p>
@@ -2086,7 +2087,7 @@
           <a:p>
             <a:fld id="{750C4F48-5AC2-ED47-9644-5F9E688EC8A9}" type="datetimeFigureOut">
               <a:rPr lang="de-DE" smtClean="0"/>
-              <a:t>06.02.25</a:t>
+              <a:t>17.02.25</a:t>
             </a:fld>
             <a:endParaRPr lang="de-DE"/>
           </a:p>
@@ -2399,7 +2400,7 @@
           <a:p>
             <a:fld id="{750C4F48-5AC2-ED47-9644-5F9E688EC8A9}" type="datetimeFigureOut">
               <a:rPr lang="de-DE" smtClean="0"/>
-              <a:t>06.02.25</a:t>
+              <a:t>17.02.25</a:t>
             </a:fld>
             <a:endParaRPr lang="de-DE"/>
           </a:p>
@@ -2688,7 +2689,7 @@
           <a:p>
             <a:fld id="{750C4F48-5AC2-ED47-9644-5F9E688EC8A9}" type="datetimeFigureOut">
               <a:rPr lang="de-DE" smtClean="0"/>
-              <a:t>06.02.25</a:t>
+              <a:t>17.02.25</a:t>
             </a:fld>
             <a:endParaRPr lang="de-DE"/>
           </a:p>
@@ -2931,7 +2932,7 @@
           <a:p>
             <a:fld id="{750C4F48-5AC2-ED47-9644-5F9E688EC8A9}" type="datetimeFigureOut">
               <a:rPr lang="de-DE" smtClean="0"/>
-              <a:t>06.02.25</a:t>
+              <a:t>17.02.25</a:t>
             </a:fld>
             <a:endParaRPr lang="de-DE"/>
           </a:p>
@@ -3612,6 +3613,517 @@
 </p:sld>
 </file>
 
+<file path=ppt/slides/slide3.xml><?xml version="1.0" encoding="utf-8"?>
+<p:sld xmlns:a="http://schemas.openxmlformats.org/drawingml/2006/main" xmlns:r="http://schemas.openxmlformats.org/officeDocument/2006/relationships" xmlns:p="http://schemas.openxmlformats.org/presentationml/2006/main">
+  <p:cSld>
+    <p:spTree>
+      <p:nvGrpSpPr>
+        <p:cNvPr id="1" name="">
+          <a:extLst>
+            <a:ext uri="{FF2B5EF4-FFF2-40B4-BE49-F238E27FC236}">
+              <a16:creationId xmlns:a16="http://schemas.microsoft.com/office/drawing/2014/main" id="{422165D5-6B3E-6E34-C8BE-17DC47FE0E1B}"/>
+            </a:ext>
+          </a:extLst>
+        </p:cNvPr>
+        <p:cNvGrpSpPr/>
+        <p:nvPr/>
+      </p:nvGrpSpPr>
+      <p:grpSpPr>
+        <a:xfrm>
+          <a:off x="0" y="0"/>
+          <a:ext cx="0" cy="0"/>
+          <a:chOff x="0" y="0"/>
+          <a:chExt cx="0" cy="0"/>
+        </a:xfrm>
+      </p:grpSpPr>
+      <p:pic>
+        <p:nvPicPr>
+          <p:cNvPr id="7" name="Picture 6">
+            <a:extLst>
+              <a:ext uri="{FF2B5EF4-FFF2-40B4-BE49-F238E27FC236}">
+                <a16:creationId xmlns:a16="http://schemas.microsoft.com/office/drawing/2014/main" id="{97653803-FB8D-215A-3DF7-CA49667BF5D8}"/>
+              </a:ext>
+            </a:extLst>
+          </p:cNvPr>
+          <p:cNvPicPr>
+            <a:picLocks noChangeAspect="1"/>
+          </p:cNvPicPr>
+          <p:nvPr/>
+        </p:nvPicPr>
+        <p:blipFill>
+          <a:blip r:embed="rId2"/>
+          <a:stretch>
+            <a:fillRect/>
+          </a:stretch>
+        </p:blipFill>
+        <p:spPr>
+          <a:xfrm>
+            <a:off x="2759220" y="703384"/>
+            <a:ext cx="6339059" cy="5705153"/>
+          </a:xfrm>
+          <a:prstGeom prst="rect">
+            <a:avLst/>
+          </a:prstGeom>
+        </p:spPr>
+      </p:pic>
+      <p:sp>
+        <p:nvSpPr>
+          <p:cNvPr id="3" name="TextBox 2">
+            <a:extLst>
+              <a:ext uri="{FF2B5EF4-FFF2-40B4-BE49-F238E27FC236}">
+                <a16:creationId xmlns:a16="http://schemas.microsoft.com/office/drawing/2014/main" id="{A7CB48B3-E599-3EB0-3EA0-75A9D2B0C6C7}"/>
+              </a:ext>
+            </a:extLst>
+          </p:cNvPr>
+          <p:cNvSpPr txBox="1"/>
+          <p:nvPr/>
+        </p:nvSpPr>
+        <p:spPr>
+          <a:xfrm>
+            <a:off x="3047048" y="1404104"/>
+            <a:ext cx="1764982" cy="523220"/>
+          </a:xfrm>
+          <a:prstGeom prst="rect">
+            <a:avLst/>
+          </a:prstGeom>
+          <a:noFill/>
+        </p:spPr>
+        <p:txBody>
+          <a:bodyPr wrap="square">
+            <a:spAutoFit/>
+          </a:bodyPr>
+          <a:lstStyle/>
+          <a:p>
+            <a:r>
+              <a:rPr lang="en-DE" sz="2800" b="1" dirty="0">
+                <a:solidFill>
+                  <a:schemeClr val="bg1"/>
+                </a:solidFill>
+              </a:rPr>
+              <a:t>OME-Zarr</a:t>
+            </a:r>
+            <a:r>
+              <a:rPr lang="en-DE" sz="2800" dirty="0">
+                <a:solidFill>
+                  <a:schemeClr val="bg1"/>
+                </a:solidFill>
+              </a:rPr>
+              <a:t> </a:t>
+            </a:r>
+          </a:p>
+        </p:txBody>
+      </p:sp>
+      <p:sp>
+        <p:nvSpPr>
+          <p:cNvPr id="11" name="TextBox 10">
+            <a:extLst>
+              <a:ext uri="{FF2B5EF4-FFF2-40B4-BE49-F238E27FC236}">
+                <a16:creationId xmlns:a16="http://schemas.microsoft.com/office/drawing/2014/main" id="{BCFCAAD5-6B6E-0A1D-CB82-BAFFE11B08A0}"/>
+              </a:ext>
+            </a:extLst>
+          </p:cNvPr>
+          <p:cNvSpPr txBox="1"/>
+          <p:nvPr/>
+        </p:nvSpPr>
+        <p:spPr>
+          <a:xfrm>
+            <a:off x="4331018" y="2366434"/>
+            <a:ext cx="1764982" cy="523220"/>
+          </a:xfrm>
+          <a:prstGeom prst="rect">
+            <a:avLst/>
+          </a:prstGeom>
+          <a:noFill/>
+        </p:spPr>
+        <p:txBody>
+          <a:bodyPr wrap="square">
+            <a:spAutoFit/>
+          </a:bodyPr>
+          <a:lstStyle/>
+          <a:p>
+            <a:r>
+              <a:rPr lang="en-DE" sz="2800" b="1" dirty="0">
+                <a:solidFill>
+                  <a:schemeClr val="bg1"/>
+                </a:solidFill>
+              </a:rPr>
+              <a:t>OME-TIFF</a:t>
+            </a:r>
+            <a:r>
+              <a:rPr lang="en-DE" sz="2800" dirty="0">
+                <a:solidFill>
+                  <a:schemeClr val="bg1"/>
+                </a:solidFill>
+              </a:rPr>
+              <a:t> </a:t>
+            </a:r>
+          </a:p>
+        </p:txBody>
+      </p:sp>
+      <p:sp>
+        <p:nvSpPr>
+          <p:cNvPr id="12" name="TextBox 11">
+            <a:extLst>
+              <a:ext uri="{FF2B5EF4-FFF2-40B4-BE49-F238E27FC236}">
+                <a16:creationId xmlns:a16="http://schemas.microsoft.com/office/drawing/2014/main" id="{85A45CF0-0306-68EB-01A6-83C1D5EEB189}"/>
+              </a:ext>
+            </a:extLst>
+          </p:cNvPr>
+          <p:cNvSpPr txBox="1"/>
+          <p:nvPr/>
+        </p:nvSpPr>
+        <p:spPr>
+          <a:xfrm>
+            <a:off x="5518308" y="897907"/>
+            <a:ext cx="1099749" cy="523220"/>
+          </a:xfrm>
+          <a:prstGeom prst="rect">
+            <a:avLst/>
+          </a:prstGeom>
+          <a:noFill/>
+        </p:spPr>
+        <p:txBody>
+          <a:bodyPr wrap="square">
+            <a:spAutoFit/>
+          </a:bodyPr>
+          <a:lstStyle/>
+          <a:p>
+            <a:r>
+              <a:rPr lang="en-DE" sz="2800" dirty="0">
+                <a:solidFill>
+                  <a:schemeClr val="bg1"/>
+                </a:solidFill>
+              </a:rPr>
+              <a:t>JPEG</a:t>
+            </a:r>
+          </a:p>
+        </p:txBody>
+      </p:sp>
+      <p:sp>
+        <p:nvSpPr>
+          <p:cNvPr id="13" name="TextBox 12">
+            <a:extLst>
+              <a:ext uri="{FF2B5EF4-FFF2-40B4-BE49-F238E27FC236}">
+                <a16:creationId xmlns:a16="http://schemas.microsoft.com/office/drawing/2014/main" id="{618D0F32-DF10-BD05-B119-3FC2F6FCF7A9}"/>
+              </a:ext>
+            </a:extLst>
+          </p:cNvPr>
+          <p:cNvSpPr txBox="1"/>
+          <p:nvPr/>
+        </p:nvSpPr>
+        <p:spPr>
+          <a:xfrm>
+            <a:off x="5614990" y="1736229"/>
+            <a:ext cx="1764982" cy="523220"/>
+          </a:xfrm>
+          <a:prstGeom prst="rect">
+            <a:avLst/>
+          </a:prstGeom>
+          <a:noFill/>
+        </p:spPr>
+        <p:txBody>
+          <a:bodyPr wrap="square">
+            <a:spAutoFit/>
+          </a:bodyPr>
+          <a:lstStyle/>
+          <a:p>
+            <a:r>
+              <a:rPr lang="en-DE" sz="2800" dirty="0">
+                <a:solidFill>
+                  <a:schemeClr val="bg1"/>
+                </a:solidFill>
+              </a:rPr>
+              <a:t>PNG</a:t>
+            </a:r>
+          </a:p>
+        </p:txBody>
+      </p:sp>
+      <p:sp>
+        <p:nvSpPr>
+          <p:cNvPr id="14" name="TextBox 13">
+            <a:extLst>
+              <a:ext uri="{FF2B5EF4-FFF2-40B4-BE49-F238E27FC236}">
+                <a16:creationId xmlns:a16="http://schemas.microsoft.com/office/drawing/2014/main" id="{DE4AE5C9-5E72-76B2-9F3E-C5DCB2B456B5}"/>
+              </a:ext>
+            </a:extLst>
+          </p:cNvPr>
+          <p:cNvSpPr txBox="1"/>
+          <p:nvPr/>
+        </p:nvSpPr>
+        <p:spPr>
+          <a:xfrm>
+            <a:off x="3173556" y="3163545"/>
+            <a:ext cx="1764982" cy="523220"/>
+          </a:xfrm>
+          <a:prstGeom prst="rect">
+            <a:avLst/>
+          </a:prstGeom>
+          <a:noFill/>
+        </p:spPr>
+        <p:txBody>
+          <a:bodyPr wrap="square">
+            <a:spAutoFit/>
+          </a:bodyPr>
+          <a:lstStyle/>
+          <a:p>
+            <a:r>
+              <a:rPr lang="en-DE" sz="2800" dirty="0">
+                <a:solidFill>
+                  <a:schemeClr val="bg1"/>
+                </a:solidFill>
+              </a:rPr>
+              <a:t>CZI</a:t>
+            </a:r>
+          </a:p>
+        </p:txBody>
+      </p:sp>
+      <p:sp>
+        <p:nvSpPr>
+          <p:cNvPr id="15" name="TextBox 14">
+            <a:extLst>
+              <a:ext uri="{FF2B5EF4-FFF2-40B4-BE49-F238E27FC236}">
+                <a16:creationId xmlns:a16="http://schemas.microsoft.com/office/drawing/2014/main" id="{337DFF12-7A6B-2258-0CFC-0E78BB3465D0}"/>
+              </a:ext>
+            </a:extLst>
+          </p:cNvPr>
+          <p:cNvSpPr txBox="1"/>
+          <p:nvPr/>
+        </p:nvSpPr>
+        <p:spPr>
+          <a:xfrm>
+            <a:off x="7309960" y="1789722"/>
+            <a:ext cx="1764982" cy="523220"/>
+          </a:xfrm>
+          <a:prstGeom prst="rect">
+            <a:avLst/>
+          </a:prstGeom>
+          <a:noFill/>
+        </p:spPr>
+        <p:txBody>
+          <a:bodyPr wrap="square">
+            <a:spAutoFit/>
+          </a:bodyPr>
+          <a:lstStyle/>
+          <a:p>
+            <a:r>
+              <a:rPr lang="en-DE" sz="2800" dirty="0">
+                <a:solidFill>
+                  <a:schemeClr val="bg1"/>
+                </a:solidFill>
+              </a:rPr>
+              <a:t>IMS</a:t>
+            </a:r>
+          </a:p>
+        </p:txBody>
+      </p:sp>
+      <p:sp>
+        <p:nvSpPr>
+          <p:cNvPr id="16" name="TextBox 15">
+            <a:extLst>
+              <a:ext uri="{FF2B5EF4-FFF2-40B4-BE49-F238E27FC236}">
+                <a16:creationId xmlns:a16="http://schemas.microsoft.com/office/drawing/2014/main" id="{B9EBC928-AF0E-3067-DF3D-F4E228D31B81}"/>
+              </a:ext>
+            </a:extLst>
+          </p:cNvPr>
+          <p:cNvSpPr txBox="1"/>
+          <p:nvPr/>
+        </p:nvSpPr>
+        <p:spPr>
+          <a:xfrm>
+            <a:off x="3490826" y="4399766"/>
+            <a:ext cx="1764982" cy="523220"/>
+          </a:xfrm>
+          <a:prstGeom prst="rect">
+            <a:avLst/>
+          </a:prstGeom>
+          <a:noFill/>
+        </p:spPr>
+        <p:txBody>
+          <a:bodyPr wrap="square">
+            <a:spAutoFit/>
+          </a:bodyPr>
+          <a:lstStyle/>
+          <a:p>
+            <a:r>
+              <a:rPr lang="en-DE" sz="2800" dirty="0">
+                <a:solidFill>
+                  <a:schemeClr val="bg1"/>
+                </a:solidFill>
+              </a:rPr>
+              <a:t>XML/HDF5</a:t>
+            </a:r>
+          </a:p>
+        </p:txBody>
+      </p:sp>
+      <p:sp>
+        <p:nvSpPr>
+          <p:cNvPr id="17" name="TextBox 16">
+            <a:extLst>
+              <a:ext uri="{FF2B5EF4-FFF2-40B4-BE49-F238E27FC236}">
+                <a16:creationId xmlns:a16="http://schemas.microsoft.com/office/drawing/2014/main" id="{E92EB0F5-C21C-B50B-7B5F-EF36884BC300}"/>
+              </a:ext>
+            </a:extLst>
+          </p:cNvPr>
+          <p:cNvSpPr txBox="1"/>
+          <p:nvPr/>
+        </p:nvSpPr>
+        <p:spPr>
+          <a:xfrm>
+            <a:off x="6664492" y="2669442"/>
+            <a:ext cx="1764982" cy="523220"/>
+          </a:xfrm>
+          <a:prstGeom prst="rect">
+            <a:avLst/>
+          </a:prstGeom>
+          <a:noFill/>
+        </p:spPr>
+        <p:txBody>
+          <a:bodyPr wrap="square">
+            <a:spAutoFit/>
+          </a:bodyPr>
+          <a:lstStyle/>
+          <a:p>
+            <a:r>
+              <a:rPr lang="en-DE" sz="2800" dirty="0">
+                <a:solidFill>
+                  <a:schemeClr val="bg1"/>
+                </a:solidFill>
+              </a:rPr>
+              <a:t>LIF</a:t>
+            </a:r>
+          </a:p>
+        </p:txBody>
+      </p:sp>
+      <p:sp>
+        <p:nvSpPr>
+          <p:cNvPr id="18" name="TextBox 17">
+            <a:extLst>
+              <a:ext uri="{FF2B5EF4-FFF2-40B4-BE49-F238E27FC236}">
+                <a16:creationId xmlns:a16="http://schemas.microsoft.com/office/drawing/2014/main" id="{AAA70880-547C-C2B0-8023-3B009204D19D}"/>
+              </a:ext>
+            </a:extLst>
+          </p:cNvPr>
+          <p:cNvSpPr txBox="1"/>
+          <p:nvPr/>
+        </p:nvSpPr>
+        <p:spPr>
+          <a:xfrm>
+            <a:off x="6618057" y="4399766"/>
+            <a:ext cx="1764982" cy="523220"/>
+          </a:xfrm>
+          <a:prstGeom prst="rect">
+            <a:avLst/>
+          </a:prstGeom>
+          <a:noFill/>
+        </p:spPr>
+        <p:txBody>
+          <a:bodyPr wrap="square">
+            <a:spAutoFit/>
+          </a:bodyPr>
+          <a:lstStyle/>
+          <a:p>
+            <a:r>
+              <a:rPr lang="en-DE" sz="2800" dirty="0">
+                <a:solidFill>
+                  <a:schemeClr val="bg1"/>
+                </a:solidFill>
+              </a:rPr>
+              <a:t>ICS/IDS</a:t>
+            </a:r>
+          </a:p>
+        </p:txBody>
+      </p:sp>
+      <p:sp>
+        <p:nvSpPr>
+          <p:cNvPr id="19" name="TextBox 18">
+            <a:extLst>
+              <a:ext uri="{FF2B5EF4-FFF2-40B4-BE49-F238E27FC236}">
+                <a16:creationId xmlns:a16="http://schemas.microsoft.com/office/drawing/2014/main" id="{B7FAFE5B-BFF8-AE26-B878-4E91F479E9C2}"/>
+              </a:ext>
+            </a:extLst>
+          </p:cNvPr>
+          <p:cNvSpPr txBox="1"/>
+          <p:nvPr/>
+        </p:nvSpPr>
+        <p:spPr>
+          <a:xfrm>
+            <a:off x="5365909" y="3410836"/>
+            <a:ext cx="1764982" cy="523220"/>
+          </a:xfrm>
+          <a:prstGeom prst="rect">
+            <a:avLst/>
+          </a:prstGeom>
+          <a:noFill/>
+        </p:spPr>
+        <p:txBody>
+          <a:bodyPr wrap="square">
+            <a:spAutoFit/>
+          </a:bodyPr>
+          <a:lstStyle/>
+          <a:p>
+            <a:r>
+              <a:rPr lang="en-DE" sz="2800" dirty="0">
+                <a:solidFill>
+                  <a:schemeClr val="bg1"/>
+                </a:solidFill>
+              </a:rPr>
+              <a:t>ND2</a:t>
+            </a:r>
+          </a:p>
+        </p:txBody>
+      </p:sp>
+      <p:sp>
+        <p:nvSpPr>
+          <p:cNvPr id="20" name="TextBox 19">
+            <a:extLst>
+              <a:ext uri="{FF2B5EF4-FFF2-40B4-BE49-F238E27FC236}">
+                <a16:creationId xmlns:a16="http://schemas.microsoft.com/office/drawing/2014/main" id="{BF2488DB-229F-C26F-951E-F142EE3D0216}"/>
+              </a:ext>
+            </a:extLst>
+          </p:cNvPr>
+          <p:cNvSpPr txBox="1"/>
+          <p:nvPr/>
+        </p:nvSpPr>
+        <p:spPr>
+          <a:xfrm>
+            <a:off x="7517542" y="1033647"/>
+            <a:ext cx="1764982" cy="523220"/>
+          </a:xfrm>
+          <a:prstGeom prst="rect">
+            <a:avLst/>
+          </a:prstGeom>
+          <a:noFill/>
+        </p:spPr>
+        <p:txBody>
+          <a:bodyPr wrap="square">
+            <a:spAutoFit/>
+          </a:bodyPr>
+          <a:lstStyle/>
+          <a:p>
+            <a:r>
+              <a:rPr lang="en-DE" sz="2800" dirty="0">
+                <a:solidFill>
+                  <a:schemeClr val="bg1"/>
+                </a:solidFill>
+              </a:rPr>
+              <a:t>…</a:t>
+            </a:r>
+          </a:p>
+        </p:txBody>
+      </p:sp>
+    </p:spTree>
+    <p:extLst>
+      <p:ext uri="{BB962C8B-B14F-4D97-AF65-F5344CB8AC3E}">
+        <p14:creationId xmlns:p14="http://schemas.microsoft.com/office/powerpoint/2010/main" val="497819062"/>
+      </p:ext>
+    </p:extLst>
+  </p:cSld>
+  <p:clrMapOvr>
+    <a:masterClrMapping/>
+  </p:clrMapOvr>
+</p:sld>
+</file>
+
 <file path=ppt/theme/theme1.xml><?xml version="1.0" encoding="utf-8"?>
 <a:theme xmlns:a="http://schemas.openxmlformats.org/drawingml/2006/main" name="Office Theme">
   <a:themeElements>

</xml_diff>